<commit_message>
Fixed spelling mistake at adjusted color
</commit_message>
<xml_diff>
--- a/presentations/indyrb/2017-03/reporting_wip.pptx
+++ b/presentations/indyrb/2017-03/reporting_wip.pptx
@@ -4556,7 +4556,11 @@
           <a:prstGeom prst="line">
             <a:avLst/>
           </a:prstGeom>
-          <a:ln w="88900"/>
+          <a:ln w="88900">
+            <a:solidFill>
+              <a:srgbClr val="00B0F0"/>
+            </a:solidFill>
+          </a:ln>
         </p:spPr>
         <p:style>
           <a:lnRef idx="1">
@@ -4587,7 +4591,11 @@
           <a:prstGeom prst="line">
             <a:avLst/>
           </a:prstGeom>
-          <a:ln w="88900"/>
+          <a:ln w="88900">
+            <a:solidFill>
+              <a:srgbClr val="00B0F0"/>
+            </a:solidFill>
+          </a:ln>
         </p:spPr>
         <p:style>
           <a:lnRef idx="1">
@@ -8214,7 +8222,15 @@
             </a:r>
             <a:r>
               <a:rPr lang="en-US" sz="3200" dirty="0" smtClean="0"/>
-              <a:t>many comments where left on posts </a:t>
+              <a:t>many comments </a:t>
+            </a:r>
+            <a:r>
+              <a:rPr lang="en-US" sz="3200" dirty="0" smtClean="0"/>
+              <a:t>were </a:t>
+            </a:r>
+            <a:r>
+              <a:rPr lang="en-US" sz="3200" dirty="0" smtClean="0"/>
+              <a:t>left on posts </a:t>
             </a:r>
             <a:r>
               <a:rPr lang="en-US" sz="3200" dirty="0"/>
@@ -8317,7 +8333,7 @@
         </p:nvCxnSpPr>
         <p:spPr>
           <a:xfrm>
-            <a:off x="7448110" y="5845480"/>
+            <a:off x="7355346" y="5845480"/>
             <a:ext cx="866156" cy="0"/>
           </a:xfrm>
           <a:prstGeom prst="line">
@@ -8325,7 +8341,7 @@
           </a:prstGeom>
           <a:ln w="88900">
             <a:solidFill>
-              <a:schemeClr val="accent1"/>
+              <a:srgbClr val="00B0F0"/>
             </a:solidFill>
           </a:ln>
         </p:spPr>
@@ -8359,7 +8375,7 @@
             <a:avLst/>
           </a:prstGeom>
           <a:solidFill>
-            <a:schemeClr val="accent1"/>
+            <a:srgbClr val="00B0F0"/>
           </a:solidFill>
         </p:spPr>
         <p:style>
@@ -8395,7 +8411,7 @@
         </p:nvCxnSpPr>
         <p:spPr>
           <a:xfrm>
-            <a:off x="8464110" y="5845480"/>
+            <a:off x="8371346" y="5845480"/>
             <a:ext cx="2237757" cy="0"/>
           </a:xfrm>
           <a:prstGeom prst="line">
@@ -8403,9 +8419,7 @@
           </a:prstGeom>
           <a:ln w="88900">
             <a:solidFill>
-              <a:schemeClr val="accent2">
-                <a:lumMod val="75000"/>
-              </a:schemeClr>
+              <a:srgbClr val="FFC000"/>
             </a:solidFill>
           </a:ln>
         </p:spPr>
@@ -8439,9 +8453,7 @@
             <a:avLst/>
           </a:prstGeom>
           <a:solidFill>
-            <a:schemeClr val="accent2">
-              <a:lumMod val="75000"/>
-            </a:schemeClr>
+            <a:srgbClr val="FFC000"/>
           </a:solidFill>
         </p:spPr>
         <p:style>
@@ -8520,7 +8532,7 @@
         </p:nvCxnSpPr>
         <p:spPr>
           <a:xfrm>
-            <a:off x="1453710" y="5882827"/>
+            <a:off x="1612735" y="5882827"/>
             <a:ext cx="3592423" cy="0"/>
           </a:xfrm>
           <a:prstGeom prst="line">

</xml_diff>